<commit_message>
Added C# screen shots
</commit_message>
<xml_diff>
--- a/assets/Calling third-party API using Refit.pptx
+++ b/assets/Calling third-party API using Refit.pptx
@@ -8,9 +8,11 @@
     <p:sldId id="256" r:id="rId2"/>
     <p:sldId id="257" r:id="rId3"/>
     <p:sldId id="258" r:id="rId4"/>
-    <p:sldId id="259" r:id="rId5"/>
-    <p:sldId id="260" r:id="rId6"/>
-    <p:sldId id="261" r:id="rId7"/>
+    <p:sldId id="262" r:id="rId5"/>
+    <p:sldId id="263" r:id="rId6"/>
+    <p:sldId id="259" r:id="rId7"/>
+    <p:sldId id="260" r:id="rId8"/>
+    <p:sldId id="261" r:id="rId9"/>
   </p:sldIdLst>
   <p:sldSz cx="12192000" cy="6858000"/>
   <p:notesSz cx="6858000" cy="9144000"/>
@@ -109,6 +111,11 @@
       </a:defRPr>
     </a:lvl9pPr>
   </p:defaultTextStyle>
+  <p:extLst>
+    <p:ext uri="{EFAFB233-063F-42B5-8137-9DF3F51BA10A}">
+      <p15:sldGuideLst xmlns:p15="http://schemas.microsoft.com/office/powerpoint/2012/main"/>
+    </p:ext>
+  </p:extLst>
 </p:presentation>
 </file>
 
@@ -1380,6 +1387,36 @@
           </a:prstGeom>
         </p:spPr>
       </p:pic>
+      <p:pic>
+        <p:nvPicPr>
+          <p:cNvPr id="10" name="Image 9">
+            <a:extLst>
+              <a:ext uri="{FF2B5EF4-FFF2-40B4-BE49-F238E27FC236}">
+                <a16:creationId xmlns:a16="http://schemas.microsoft.com/office/drawing/2014/main" id="{FE4F1912-3A77-4CD6-964D-6D7775AC3229}"/>
+              </a:ext>
+            </a:extLst>
+          </p:cNvPr>
+          <p:cNvPicPr>
+            <a:picLocks noChangeAspect="1"/>
+          </p:cNvPicPr>
+          <p:nvPr/>
+        </p:nvPicPr>
+        <p:blipFill>
+          <a:blip r:embed="rId9"/>
+          <a:stretch>
+            <a:fillRect/>
+          </a:stretch>
+        </p:blipFill>
+        <p:spPr>
+          <a:xfrm>
+            <a:off x="5389200" y="1058708"/>
+            <a:ext cx="6344535" cy="1552792"/>
+          </a:xfrm>
+          <a:prstGeom prst="rect">
+            <a:avLst/>
+          </a:prstGeom>
+        </p:spPr>
+      </p:pic>
     </p:spTree>
     <p:extLst>
       <p:ext uri="{BB962C8B-B14F-4D97-AF65-F5344CB8AC3E}">
@@ -1652,6 +1689,59 @@
                       </p:childTnLst>
                     </p:cTn>
                   </p:par>
+                  <p:par>
+                    <p:cTn id="26" fill="hold">
+                      <p:stCondLst>
+                        <p:cond delay="indefinite"/>
+                      </p:stCondLst>
+                      <p:childTnLst>
+                        <p:par>
+                          <p:cTn id="27" fill="hold">
+                            <p:stCondLst>
+                              <p:cond delay="0"/>
+                            </p:stCondLst>
+                            <p:childTnLst>
+                              <p:par>
+                                <p:cTn id="28" presetID="10" presetClass="entr" presetSubtype="0" fill="hold" nodeType="clickEffect">
+                                  <p:stCondLst>
+                                    <p:cond delay="0"/>
+                                  </p:stCondLst>
+                                  <p:childTnLst>
+                                    <p:set>
+                                      <p:cBhvr>
+                                        <p:cTn id="29" dur="1" fill="hold">
+                                          <p:stCondLst>
+                                            <p:cond delay="0"/>
+                                          </p:stCondLst>
+                                        </p:cTn>
+                                        <p:tgtEl>
+                                          <p:spTgt spid="10"/>
+                                        </p:tgtEl>
+                                        <p:attrNameLst>
+                                          <p:attrName>style.visibility</p:attrName>
+                                        </p:attrNameLst>
+                                      </p:cBhvr>
+                                      <p:to>
+                                        <p:strVal val="visible"/>
+                                      </p:to>
+                                    </p:set>
+                                    <p:animEffect transition="in" filter="fade">
+                                      <p:cBhvr>
+                                        <p:cTn id="30" dur="500"/>
+                                        <p:tgtEl>
+                                          <p:spTgt spid="10"/>
+                                        </p:tgtEl>
+                                      </p:cBhvr>
+                                    </p:animEffect>
+                                  </p:childTnLst>
+                                </p:cTn>
+                              </p:par>
+                            </p:childTnLst>
+                          </p:cTn>
+                        </p:par>
+                      </p:childTnLst>
+                    </p:cTn>
+                  </p:par>
                 </p:childTnLst>
               </p:cTn>
               <p:prevCondLst>
@@ -1678,6 +1768,498 @@
 </file>
 
 <file path=ppt/slides/slide4.xml><?xml version="1.0" encoding="utf-8"?>
+<p:sld xmlns:a="http://schemas.openxmlformats.org/drawingml/2006/main" xmlns:r="http://schemas.openxmlformats.org/officeDocument/2006/relationships" xmlns:p="http://schemas.openxmlformats.org/presentationml/2006/main">
+  <p:cSld>
+    <p:spTree>
+      <p:nvGrpSpPr>
+        <p:cNvPr id="1" name=""/>
+        <p:cNvGrpSpPr/>
+        <p:nvPr/>
+      </p:nvGrpSpPr>
+      <p:grpSpPr>
+        <a:xfrm>
+          <a:off x="0" y="0"/>
+          <a:ext cx="0" cy="0"/>
+          <a:chOff x="0" y="0"/>
+          <a:chExt cx="0" cy="0"/>
+        </a:xfrm>
+      </p:grpSpPr>
+      <p:sp>
+        <p:nvSpPr>
+          <p:cNvPr id="2" name="ZoneTexte 1">
+            <a:extLst>
+              <a:ext uri="{FF2B5EF4-FFF2-40B4-BE49-F238E27FC236}">
+                <a16:creationId xmlns:a16="http://schemas.microsoft.com/office/drawing/2014/main" id="{39089484-68A9-4D12-BA22-7FCD53D10C42}"/>
+              </a:ext>
+            </a:extLst>
+          </p:cNvPr>
+          <p:cNvSpPr txBox="1"/>
+          <p:nvPr/>
+        </p:nvSpPr>
+        <p:spPr>
+          <a:xfrm>
+            <a:off x="266700" y="285750"/>
+            <a:ext cx="9782735" cy="400110"/>
+          </a:xfrm>
+          <a:prstGeom prst="rect">
+            <a:avLst/>
+          </a:prstGeom>
+          <a:noFill/>
+        </p:spPr>
+        <p:txBody>
+          <a:bodyPr wrap="square" rtlCol="0">
+            <a:spAutoFit/>
+          </a:bodyPr>
+          <a:lstStyle/>
+          <a:p>
+            <a:r>
+              <a:rPr lang="fr-FR" sz="2000" b="1" dirty="0" err="1">
+                <a:latin typeface="Courier New" panose="02070309020205020404" pitchFamily="49" charset="0"/>
+                <a:cs typeface="Courier New" panose="02070309020205020404" pitchFamily="49" charset="0"/>
+              </a:rPr>
+              <a:t>AddHttpClient</a:t>
+            </a:r>
+            <a:r>
+              <a:rPr lang="fr-FR" sz="2000" b="1" dirty="0">
+                <a:latin typeface="Courier New" panose="02070309020205020404" pitchFamily="49" charset="0"/>
+                <a:cs typeface="Courier New" panose="02070309020205020404" pitchFamily="49" charset="0"/>
+              </a:rPr>
+              <a:t>(string </a:t>
+            </a:r>
+            <a:r>
+              <a:rPr lang="fr-FR" sz="2000" b="1" dirty="0" err="1">
+                <a:latin typeface="Courier New" panose="02070309020205020404" pitchFamily="49" charset="0"/>
+                <a:cs typeface="Courier New" panose="02070309020205020404" pitchFamily="49" charset="0"/>
+              </a:rPr>
+              <a:t>name</a:t>
+            </a:r>
+            <a:r>
+              <a:rPr lang="fr-FR" sz="2000" b="1" dirty="0">
+                <a:latin typeface="Courier New" panose="02070309020205020404" pitchFamily="49" charset="0"/>
+                <a:cs typeface="Courier New" panose="02070309020205020404" pitchFamily="49" charset="0"/>
+              </a:rPr>
+              <a:t>, </a:t>
+            </a:r>
+            <a:r>
+              <a:rPr lang="fr-FR" sz="2000" b="1" dirty="0" err="1">
+                <a:latin typeface="Courier New" panose="02070309020205020404" pitchFamily="49" charset="0"/>
+                <a:cs typeface="Courier New" panose="02070309020205020404" pitchFamily="49" charset="0"/>
+              </a:rPr>
+              <a:t>IServiceCollections</a:t>
+            </a:r>
+            <a:r>
+              <a:rPr lang="fr-FR" sz="2000" b="1" dirty="0">
+                <a:latin typeface="Courier New" panose="02070309020205020404" pitchFamily="49" charset="0"/>
+                <a:cs typeface="Courier New" panose="02070309020205020404" pitchFamily="49" charset="0"/>
+              </a:rPr>
+              <a:t> services);</a:t>
+            </a:r>
+          </a:p>
+        </p:txBody>
+      </p:sp>
+      <p:pic>
+        <p:nvPicPr>
+          <p:cNvPr id="6" name="Image 5">
+            <a:extLst>
+              <a:ext uri="{FF2B5EF4-FFF2-40B4-BE49-F238E27FC236}">
+                <a16:creationId xmlns:a16="http://schemas.microsoft.com/office/drawing/2014/main" id="{ED5E4A67-182D-4C3C-8B99-5FE4D3AB5BE9}"/>
+              </a:ext>
+            </a:extLst>
+          </p:cNvPr>
+          <p:cNvPicPr>
+            <a:picLocks noChangeAspect="1"/>
+          </p:cNvPicPr>
+          <p:nvPr/>
+        </p:nvPicPr>
+        <p:blipFill>
+          <a:blip r:embed="rId2"/>
+          <a:stretch>
+            <a:fillRect/>
+          </a:stretch>
+        </p:blipFill>
+        <p:spPr>
+          <a:xfrm>
+            <a:off x="266700" y="870525"/>
+            <a:ext cx="8592749" cy="2896004"/>
+          </a:xfrm>
+          <a:prstGeom prst="rect">
+            <a:avLst/>
+          </a:prstGeom>
+        </p:spPr>
+      </p:pic>
+      <p:pic>
+        <p:nvPicPr>
+          <p:cNvPr id="4" name="Image 3">
+            <a:extLst>
+              <a:ext uri="{FF2B5EF4-FFF2-40B4-BE49-F238E27FC236}">
+                <a16:creationId xmlns:a16="http://schemas.microsoft.com/office/drawing/2014/main" id="{D10656F8-9145-4139-BD92-A6A1710C8A24}"/>
+              </a:ext>
+            </a:extLst>
+          </p:cNvPr>
+          <p:cNvPicPr>
+            <a:picLocks noChangeAspect="1"/>
+          </p:cNvPicPr>
+          <p:nvPr/>
+        </p:nvPicPr>
+        <p:blipFill>
+          <a:blip r:embed="rId3"/>
+          <a:stretch>
+            <a:fillRect/>
+          </a:stretch>
+        </p:blipFill>
+        <p:spPr>
+          <a:xfrm>
+            <a:off x="5588373" y="4137159"/>
+            <a:ext cx="5277587" cy="2286319"/>
+          </a:xfrm>
+          <a:prstGeom prst="rect">
+            <a:avLst/>
+          </a:prstGeom>
+        </p:spPr>
+      </p:pic>
+    </p:spTree>
+    <p:extLst>
+      <p:ext uri="{BB962C8B-B14F-4D97-AF65-F5344CB8AC3E}">
+        <p14:creationId xmlns:p14="http://schemas.microsoft.com/office/powerpoint/2010/main" val="3774218025"/>
+      </p:ext>
+    </p:extLst>
+  </p:cSld>
+  <p:clrMapOvr>
+    <a:masterClrMapping/>
+  </p:clrMapOvr>
+  <p:timing>
+    <p:tnLst>
+      <p:par>
+        <p:cTn id="1" dur="indefinite" restart="never" nodeType="tmRoot">
+          <p:childTnLst>
+            <p:seq concurrent="1" nextAc="seek">
+              <p:cTn id="2" dur="indefinite" nodeType="mainSeq">
+                <p:childTnLst>
+                  <p:par>
+                    <p:cTn id="3" fill="hold">
+                      <p:stCondLst>
+                        <p:cond delay="indefinite"/>
+                      </p:stCondLst>
+                      <p:childTnLst>
+                        <p:par>
+                          <p:cTn id="4" fill="hold">
+                            <p:stCondLst>
+                              <p:cond delay="0"/>
+                            </p:stCondLst>
+                            <p:childTnLst>
+                              <p:par>
+                                <p:cTn id="5" presetID="10" presetClass="entr" presetSubtype="0" fill="hold" nodeType="clickEffect">
+                                  <p:stCondLst>
+                                    <p:cond delay="0"/>
+                                  </p:stCondLst>
+                                  <p:childTnLst>
+                                    <p:set>
+                                      <p:cBhvr>
+                                        <p:cTn id="6" dur="1" fill="hold">
+                                          <p:stCondLst>
+                                            <p:cond delay="0"/>
+                                          </p:stCondLst>
+                                        </p:cTn>
+                                        <p:tgtEl>
+                                          <p:spTgt spid="4"/>
+                                        </p:tgtEl>
+                                        <p:attrNameLst>
+                                          <p:attrName>style.visibility</p:attrName>
+                                        </p:attrNameLst>
+                                      </p:cBhvr>
+                                      <p:to>
+                                        <p:strVal val="visible"/>
+                                      </p:to>
+                                    </p:set>
+                                    <p:animEffect transition="in" filter="fade">
+                                      <p:cBhvr>
+                                        <p:cTn id="7" dur="500"/>
+                                        <p:tgtEl>
+                                          <p:spTgt spid="4"/>
+                                        </p:tgtEl>
+                                      </p:cBhvr>
+                                    </p:animEffect>
+                                  </p:childTnLst>
+                                </p:cTn>
+                              </p:par>
+                            </p:childTnLst>
+                          </p:cTn>
+                        </p:par>
+                      </p:childTnLst>
+                    </p:cTn>
+                  </p:par>
+                </p:childTnLst>
+              </p:cTn>
+              <p:prevCondLst>
+                <p:cond evt="onPrev" delay="0">
+                  <p:tgtEl>
+                    <p:sldTgt/>
+                  </p:tgtEl>
+                </p:cond>
+              </p:prevCondLst>
+              <p:nextCondLst>
+                <p:cond evt="onNext" delay="0">
+                  <p:tgtEl>
+                    <p:sldTgt/>
+                  </p:tgtEl>
+                </p:cond>
+              </p:nextCondLst>
+            </p:seq>
+          </p:childTnLst>
+        </p:cTn>
+      </p:par>
+    </p:tnLst>
+  </p:timing>
+</p:sld>
+</file>
+
+<file path=ppt/slides/slide5.xml><?xml version="1.0" encoding="utf-8"?>
+<p:sld xmlns:a="http://schemas.openxmlformats.org/drawingml/2006/main" xmlns:r="http://schemas.openxmlformats.org/officeDocument/2006/relationships" xmlns:p="http://schemas.openxmlformats.org/presentationml/2006/main">
+  <p:cSld>
+    <p:spTree>
+      <p:nvGrpSpPr>
+        <p:cNvPr id="1" name=""/>
+        <p:cNvGrpSpPr/>
+        <p:nvPr/>
+      </p:nvGrpSpPr>
+      <p:grpSpPr>
+        <a:xfrm>
+          <a:off x="0" y="0"/>
+          <a:ext cx="0" cy="0"/>
+          <a:chOff x="0" y="0"/>
+          <a:chExt cx="0" cy="0"/>
+        </a:xfrm>
+      </p:grpSpPr>
+      <p:sp>
+        <p:nvSpPr>
+          <p:cNvPr id="2" name="ZoneTexte 1">
+            <a:extLst>
+              <a:ext uri="{FF2B5EF4-FFF2-40B4-BE49-F238E27FC236}">
+                <a16:creationId xmlns:a16="http://schemas.microsoft.com/office/drawing/2014/main" id="{39089484-68A9-4D12-BA22-7FCD53D10C42}"/>
+              </a:ext>
+            </a:extLst>
+          </p:cNvPr>
+          <p:cNvSpPr txBox="1"/>
+          <p:nvPr/>
+        </p:nvSpPr>
+        <p:spPr>
+          <a:xfrm>
+            <a:off x="266700" y="285750"/>
+            <a:ext cx="9782735" cy="400110"/>
+          </a:xfrm>
+          <a:prstGeom prst="rect">
+            <a:avLst/>
+          </a:prstGeom>
+          <a:noFill/>
+        </p:spPr>
+        <p:txBody>
+          <a:bodyPr wrap="square" rtlCol="0">
+            <a:spAutoFit/>
+          </a:bodyPr>
+          <a:lstStyle/>
+          <a:p>
+            <a:r>
+              <a:rPr lang="fr-FR" sz="2000" b="1" dirty="0" err="1">
+                <a:latin typeface="Courier New" panose="02070309020205020404" pitchFamily="49" charset="0"/>
+                <a:cs typeface="Courier New" panose="02070309020205020404" pitchFamily="49" charset="0"/>
+              </a:rPr>
+              <a:t>AddTypedClient</a:t>
+            </a:r>
+            <a:r>
+              <a:rPr lang="fr-FR" sz="2000" b="1" dirty="0">
+                <a:latin typeface="Courier New" panose="02070309020205020404" pitchFamily="49" charset="0"/>
+                <a:cs typeface="Courier New" panose="02070309020205020404" pitchFamily="49" charset="0"/>
+              </a:rPr>
+              <a:t>(c =&gt; </a:t>
+            </a:r>
+            <a:r>
+              <a:rPr lang="fr-FR" sz="2000" b="1" dirty="0" err="1">
+                <a:latin typeface="Courier New" panose="02070309020205020404" pitchFamily="49" charset="0"/>
+                <a:cs typeface="Courier New" panose="02070309020205020404" pitchFamily="49" charset="0"/>
+              </a:rPr>
+              <a:t>RestService.For</a:t>
+            </a:r>
+            <a:r>
+              <a:rPr lang="fr-FR" sz="2000" b="1" dirty="0">
+                <a:latin typeface="Courier New" panose="02070309020205020404" pitchFamily="49" charset="0"/>
+                <a:cs typeface="Courier New" panose="02070309020205020404" pitchFamily="49" charset="0"/>
+              </a:rPr>
+              <a:t>&lt;</a:t>
+            </a:r>
+            <a:r>
+              <a:rPr lang="fr-FR" sz="2000" b="1" dirty="0" err="1">
+                <a:latin typeface="Courier New" panose="02070309020205020404" pitchFamily="49" charset="0"/>
+                <a:cs typeface="Courier New" panose="02070309020205020404" pitchFamily="49" charset="0"/>
+              </a:rPr>
+              <a:t>IHttpBinOrgApi</a:t>
+            </a:r>
+            <a:r>
+              <a:rPr lang="fr-FR" sz="2000" b="1" dirty="0">
+                <a:latin typeface="Courier New" panose="02070309020205020404" pitchFamily="49" charset="0"/>
+                <a:cs typeface="Courier New" panose="02070309020205020404" pitchFamily="49" charset="0"/>
+              </a:rPr>
+              <a:t>&gt;(c));</a:t>
+            </a:r>
+          </a:p>
+        </p:txBody>
+      </p:sp>
+      <p:pic>
+        <p:nvPicPr>
+          <p:cNvPr id="10" name="Image 9">
+            <a:extLst>
+              <a:ext uri="{FF2B5EF4-FFF2-40B4-BE49-F238E27FC236}">
+                <a16:creationId xmlns:a16="http://schemas.microsoft.com/office/drawing/2014/main" id="{2164EECB-B366-4149-A7D5-FC6D8A4FF0EC}"/>
+              </a:ext>
+            </a:extLst>
+          </p:cNvPr>
+          <p:cNvPicPr>
+            <a:picLocks noChangeAspect="1"/>
+          </p:cNvPicPr>
+          <p:nvPr/>
+        </p:nvPicPr>
+        <p:blipFill>
+          <a:blip r:embed="rId2"/>
+          <a:stretch>
+            <a:fillRect/>
+          </a:stretch>
+        </p:blipFill>
+        <p:spPr>
+          <a:xfrm>
+            <a:off x="266700" y="870525"/>
+            <a:ext cx="7621064" cy="2915057"/>
+          </a:xfrm>
+          <a:prstGeom prst="rect">
+            <a:avLst/>
+          </a:prstGeom>
+        </p:spPr>
+      </p:pic>
+      <p:pic>
+        <p:nvPicPr>
+          <p:cNvPr id="8" name="Image 7">
+            <a:extLst>
+              <a:ext uri="{FF2B5EF4-FFF2-40B4-BE49-F238E27FC236}">
+                <a16:creationId xmlns:a16="http://schemas.microsoft.com/office/drawing/2014/main" id="{817DA02F-A1C9-447F-B1F6-64DA596B7373}"/>
+              </a:ext>
+            </a:extLst>
+          </p:cNvPr>
+          <p:cNvPicPr>
+            <a:picLocks noChangeAspect="1"/>
+          </p:cNvPicPr>
+          <p:nvPr/>
+        </p:nvPicPr>
+        <p:blipFill>
+          <a:blip r:embed="rId3"/>
+          <a:stretch>
+            <a:fillRect/>
+          </a:stretch>
+        </p:blipFill>
+        <p:spPr>
+          <a:xfrm>
+            <a:off x="6523871" y="3429000"/>
+            <a:ext cx="5401429" cy="3143689"/>
+          </a:xfrm>
+          <a:prstGeom prst="rect">
+            <a:avLst/>
+          </a:prstGeom>
+        </p:spPr>
+      </p:pic>
+    </p:spTree>
+    <p:extLst>
+      <p:ext uri="{BB962C8B-B14F-4D97-AF65-F5344CB8AC3E}">
+        <p14:creationId xmlns:p14="http://schemas.microsoft.com/office/powerpoint/2010/main" val="3111788915"/>
+      </p:ext>
+    </p:extLst>
+  </p:cSld>
+  <p:clrMapOvr>
+    <a:masterClrMapping/>
+  </p:clrMapOvr>
+  <p:timing>
+    <p:tnLst>
+      <p:par>
+        <p:cTn id="1" dur="indefinite" restart="never" nodeType="tmRoot">
+          <p:childTnLst>
+            <p:seq concurrent="1" nextAc="seek">
+              <p:cTn id="2" dur="indefinite" nodeType="mainSeq">
+                <p:childTnLst>
+                  <p:par>
+                    <p:cTn id="3" fill="hold">
+                      <p:stCondLst>
+                        <p:cond delay="indefinite"/>
+                      </p:stCondLst>
+                      <p:childTnLst>
+                        <p:par>
+                          <p:cTn id="4" fill="hold">
+                            <p:stCondLst>
+                              <p:cond delay="0"/>
+                            </p:stCondLst>
+                            <p:childTnLst>
+                              <p:par>
+                                <p:cTn id="5" presetID="10" presetClass="entr" presetSubtype="0" fill="hold" nodeType="clickEffect">
+                                  <p:stCondLst>
+                                    <p:cond delay="0"/>
+                                  </p:stCondLst>
+                                  <p:childTnLst>
+                                    <p:set>
+                                      <p:cBhvr>
+                                        <p:cTn id="6" dur="1" fill="hold">
+                                          <p:stCondLst>
+                                            <p:cond delay="0"/>
+                                          </p:stCondLst>
+                                        </p:cTn>
+                                        <p:tgtEl>
+                                          <p:spTgt spid="8"/>
+                                        </p:tgtEl>
+                                        <p:attrNameLst>
+                                          <p:attrName>style.visibility</p:attrName>
+                                        </p:attrNameLst>
+                                      </p:cBhvr>
+                                      <p:to>
+                                        <p:strVal val="visible"/>
+                                      </p:to>
+                                    </p:set>
+                                    <p:animEffect transition="in" filter="fade">
+                                      <p:cBhvr>
+                                        <p:cTn id="7" dur="500"/>
+                                        <p:tgtEl>
+                                          <p:spTgt spid="8"/>
+                                        </p:tgtEl>
+                                      </p:cBhvr>
+                                    </p:animEffect>
+                                  </p:childTnLst>
+                                </p:cTn>
+                              </p:par>
+                            </p:childTnLst>
+                          </p:cTn>
+                        </p:par>
+                      </p:childTnLst>
+                    </p:cTn>
+                  </p:par>
+                </p:childTnLst>
+              </p:cTn>
+              <p:prevCondLst>
+                <p:cond evt="onPrev" delay="0">
+                  <p:tgtEl>
+                    <p:sldTgt/>
+                  </p:tgtEl>
+                </p:cond>
+              </p:prevCondLst>
+              <p:nextCondLst>
+                <p:cond evt="onNext" delay="0">
+                  <p:tgtEl>
+                    <p:sldTgt/>
+                  </p:tgtEl>
+                </p:cond>
+              </p:nextCondLst>
+            </p:seq>
+          </p:childTnLst>
+        </p:cTn>
+      </p:par>
+    </p:tnLst>
+  </p:timing>
+</p:sld>
+</file>
+
+<file path=ppt/slides/slide6.xml><?xml version="1.0" encoding="utf-8"?>
 <p:sld xmlns:a="http://schemas.openxmlformats.org/drawingml/2006/main" xmlns:r="http://schemas.openxmlformats.org/officeDocument/2006/relationships" xmlns:p="http://schemas.openxmlformats.org/presentationml/2006/main">
   <p:cSld>
     <p:spTree>
@@ -2322,7 +2904,7 @@
 </p:sld>
 </file>
 
-<file path=ppt/slides/slide5.xml><?xml version="1.0" encoding="utf-8"?>
+<file path=ppt/slides/slide7.xml><?xml version="1.0" encoding="utf-8"?>
 <p:sld xmlns:a="http://schemas.openxmlformats.org/drawingml/2006/main" xmlns:r="http://schemas.openxmlformats.org/officeDocument/2006/relationships" xmlns:p="http://schemas.openxmlformats.org/presentationml/2006/main">
   <p:cSld>
     <p:spTree>
@@ -3212,7 +3794,7 @@
 </p:sld>
 </file>
 
-<file path=ppt/slides/slide6.xml><?xml version="1.0" encoding="utf-8"?>
+<file path=ppt/slides/slide8.xml><?xml version="1.0" encoding="utf-8"?>
 <p:sld xmlns:a="http://schemas.openxmlformats.org/drawingml/2006/main" xmlns:r="http://schemas.openxmlformats.org/officeDocument/2006/relationships" xmlns:p="http://schemas.openxmlformats.org/presentationml/2006/main">
   <p:cSld>
     <p:spTree>

</xml_diff>

<commit_message>
Updated IHttpClientFactory code snippet.
</commit_message>
<xml_diff>
--- a/assets/Calling third-party API using Refit.pptx
+++ b/assets/Calling third-party API using Refit.pptx
@@ -1889,10 +1889,10 @@
       </p:pic>
       <p:pic>
         <p:nvPicPr>
-          <p:cNvPr id="4" name="Image 3">
-            <a:extLst>
-              <a:ext uri="{FF2B5EF4-FFF2-40B4-BE49-F238E27FC236}">
-                <a16:creationId xmlns:a16="http://schemas.microsoft.com/office/drawing/2014/main" id="{D10656F8-9145-4139-BD92-A6A1710C8A24}"/>
+          <p:cNvPr id="5" name="Image 4">
+            <a:extLst>
+              <a:ext uri="{FF2B5EF4-FFF2-40B4-BE49-F238E27FC236}">
+                <a16:creationId xmlns:a16="http://schemas.microsoft.com/office/drawing/2014/main" id="{DC0A16E7-1B0B-44AD-9A74-988B01BECBD4}"/>
               </a:ext>
             </a:extLst>
           </p:cNvPr>
@@ -1909,8 +1909,8 @@
         </p:blipFill>
         <p:spPr>
           <a:xfrm>
-            <a:off x="5588373" y="4137159"/>
-            <a:ext cx="5277587" cy="2286319"/>
+            <a:off x="5773423" y="4502090"/>
+            <a:ext cx="5544324" cy="1276528"/>
           </a:xfrm>
           <a:prstGeom prst="rect">
             <a:avLst/>
@@ -1948,7 +1948,7 @@
                             </p:stCondLst>
                             <p:childTnLst>
                               <p:par>
-                                <p:cTn id="5" presetID="10" presetClass="entr" presetSubtype="0" fill="hold" nodeType="clickEffect">
+                                <p:cTn id="5" presetID="1" presetClass="entr" presetSubtype="0" fill="hold" nodeType="clickEffect">
                                   <p:stCondLst>
                                     <p:cond delay="0"/>
                                   </p:stCondLst>
@@ -1961,7 +1961,7 @@
                                           </p:stCondLst>
                                         </p:cTn>
                                         <p:tgtEl>
-                                          <p:spTgt spid="4"/>
+                                          <p:spTgt spid="5"/>
                                         </p:tgtEl>
                                         <p:attrNameLst>
                                           <p:attrName>style.visibility</p:attrName>
@@ -1971,14 +1971,6 @@
                                         <p:strVal val="visible"/>
                                       </p:to>
                                     </p:set>
-                                    <p:animEffect transition="in" filter="fade">
-                                      <p:cBhvr>
-                                        <p:cTn id="7" dur="500"/>
-                                        <p:tgtEl>
-                                          <p:spTgt spid="4"/>
-                                        </p:tgtEl>
-                                      </p:cBhvr>
-                                    </p:animEffect>
                                   </p:childTnLst>
                                 </p:cTn>
                               </p:par>

</xml_diff>